<commit_message>
Trying to improve results of EA.
</commit_message>
<xml_diff>
--- a/Documentation/Sprint2/Presentation.pptx
+++ b/Documentation/Sprint2/Presentation.pptx
@@ -122,6 +122,11 @@
       </a:defRPr>
     </a:lvl9pPr>
   </p:defaultTextStyle>
+  <p:extLst>
+    <p:ext uri="{EFAFB233-063F-42B5-8137-9DF3F51BA10A}">
+      <p15:sldGuideLst xmlns:p15="http://schemas.microsoft.com/office/powerpoint/2012/main"/>
+    </p:ext>
+  </p:extLst>
 </p:presentation>
 </file>
 
@@ -5060,7 +5065,7 @@
         </p:nvSpPr>
         <p:spPr>
           <a:xfrm>
-            <a:off x="838200" y="1123950"/>
+            <a:off x="838200" y="969168"/>
             <a:ext cx="10515600" cy="5053013"/>
           </a:xfrm>
         </p:spPr>
@@ -5072,8 +5077,8 @@
               <a:buAutoNum type="arabicPeriod"/>
             </a:pPr>
             <a:r>
-              <a:rPr lang="en-GB" sz="2000" dirty="0"/>
-              <a:t>Try using only mutation, not crossover.</a:t>
+              <a:rPr lang="en-GB" sz="2400" dirty="0"/>
+              <a:t>Stopped using crossover. Only used mutation and permutation.</a:t>
             </a:r>
           </a:p>
           <a:p>
@@ -5081,8 +5086,8 @@
               <a:buAutoNum type="arabicPeriod"/>
             </a:pPr>
             <a:r>
-              <a:rPr lang="en-GB" sz="2000" dirty="0"/>
-              <a:t>Increase population size to 8.</a:t>
+              <a:rPr lang="en-GB" sz="2400" dirty="0"/>
+              <a:t>Increased population size from 4 to 10.</a:t>
             </a:r>
           </a:p>
           <a:p>
@@ -5090,8 +5095,8 @@
               <a:buAutoNum type="arabicPeriod"/>
             </a:pPr>
             <a:r>
-              <a:rPr lang="en-GB" sz="2000" dirty="0"/>
-              <a:t>Do more permutations, as these produced the best results.</a:t>
+              <a:rPr lang="en-GB" sz="2400" dirty="0"/>
+              <a:t>Introduced more regular permutations, as these produced the best results.</a:t>
             </a:r>
           </a:p>
           <a:p>
@@ -5099,8 +5104,8 @@
               <a:buAutoNum type="arabicPeriod"/>
             </a:pPr>
             <a:r>
-              <a:rPr lang="en-GB" sz="2000" dirty="0"/>
-              <a:t>Use smaller random mutation ranges.</a:t>
+              <a:rPr lang="en-GB" sz="2400" dirty="0"/>
+              <a:t>Adjusted random mutation ranges.</a:t>
             </a:r>
           </a:p>
           <a:p>
@@ -5108,8 +5113,26 @@
               <a:buAutoNum type="arabicPeriod"/>
             </a:pPr>
             <a:r>
-              <a:rPr lang="en-GB" sz="2000" dirty="0"/>
-              <a:t>Specify stricter stopping criteria.</a:t>
+              <a:rPr lang="en-GB" sz="2400" dirty="0"/>
+              <a:t>Introduced an extra random structure at each iteration with less extreme alterations.</a:t>
+            </a:r>
+          </a:p>
+          <a:p>
+            <a:pPr marL="514350" indent="-514350">
+              <a:buAutoNum type="arabicPeriod"/>
+            </a:pPr>
+            <a:r>
+              <a:rPr lang="en-GB" sz="2400" dirty="0"/>
+              <a:t>Specified stricter stopping criteria.</a:t>
+            </a:r>
+          </a:p>
+          <a:p>
+            <a:pPr marL="514350" indent="-514350">
+              <a:buAutoNum type="arabicPeriod"/>
+            </a:pPr>
+            <a:r>
+              <a:rPr lang="en-GB" sz="2400" dirty="0"/>
+              <a:t>Acetone example:</a:t>
             </a:r>
           </a:p>
           <a:p>
@@ -5126,6 +5149,83 @@
           </a:p>
         </p:txBody>
       </p:sp>
+      <p:pic>
+        <p:nvPicPr>
+          <p:cNvPr id="5" name="Picture 4">
+            <a:extLst>
+              <a:ext uri="{FF2B5EF4-FFF2-40B4-BE49-F238E27FC236}">
+                <a16:creationId xmlns:a16="http://schemas.microsoft.com/office/drawing/2014/main" id="{924F31FB-6097-41DD-8314-5CF94BEEAFAA}"/>
+              </a:ext>
+            </a:extLst>
+          </p:cNvPr>
+          <p:cNvPicPr>
+            <a:picLocks noChangeAspect="1"/>
+          </p:cNvPicPr>
+          <p:nvPr/>
+        </p:nvPicPr>
+        <p:blipFill>
+          <a:blip r:embed="rId2"/>
+          <a:stretch>
+            <a:fillRect/>
+          </a:stretch>
+        </p:blipFill>
+        <p:spPr>
+          <a:xfrm>
+            <a:off x="152400" y="4762500"/>
+            <a:ext cx="4122903" cy="1867694"/>
+          </a:xfrm>
+          <a:prstGeom prst="rect">
+            <a:avLst/>
+          </a:prstGeom>
+        </p:spPr>
+      </p:pic>
+      <p:pic>
+        <p:nvPicPr>
+          <p:cNvPr id="6" name="Picture 2" descr="3d model of c3h6o">
+            <a:extLst>
+              <a:ext uri="{FF2B5EF4-FFF2-40B4-BE49-F238E27FC236}">
+                <a16:creationId xmlns:a16="http://schemas.microsoft.com/office/drawing/2014/main" id="{240EA5AB-C85D-4F91-99F2-A03F865B0208}"/>
+              </a:ext>
+            </a:extLst>
+          </p:cNvPr>
+          <p:cNvPicPr>
+            <a:picLocks noChangeAspect="1" noChangeArrowheads="1"/>
+          </p:cNvPicPr>
+          <p:nvPr/>
+        </p:nvPicPr>
+        <p:blipFill>
+          <a:blip r:embed="rId3">
+            <a:extLst>
+              <a:ext uri="{28A0092B-C50C-407E-A947-70E740481C1C}">
+                <a14:useLocalDpi xmlns:a14="http://schemas.microsoft.com/office/drawing/2010/main" val="0"/>
+              </a:ext>
+            </a:extLst>
+          </a:blip>
+          <a:srcRect/>
+          <a:stretch>
+            <a:fillRect/>
+          </a:stretch>
+        </p:blipFill>
+        <p:spPr bwMode="auto">
+          <a:xfrm>
+            <a:off x="8817562" y="4070866"/>
+            <a:ext cx="2857500" cy="2857500"/>
+          </a:xfrm>
+          <a:prstGeom prst="rect">
+            <a:avLst/>
+          </a:prstGeom>
+          <a:noFill/>
+          <a:extLst>
+            <a:ext uri="{909E8E84-426E-40DD-AFC4-6F175D3DCCD1}">
+              <a14:hiddenFill xmlns:a14="http://schemas.microsoft.com/office/drawing/2010/main">
+                <a:solidFill>
+                  <a:srgbClr val="FFFFFF"/>
+                </a:solidFill>
+              </a14:hiddenFill>
+            </a:ext>
+          </a:extLst>
+        </p:spPr>
+      </p:pic>
     </p:spTree>
     <p:extLst>
       <p:ext uri="{BB962C8B-B14F-4D97-AF65-F5344CB8AC3E}">

</xml_diff>

<commit_message>
Tried to improve EA.
</commit_message>
<xml_diff>
--- a/Documentation/Sprint2/Presentation.pptx
+++ b/Documentation/Sprint2/Presentation.pptx
@@ -5077,7 +5077,7 @@
               <a:buAutoNum type="arabicPeriod"/>
             </a:pPr>
             <a:r>
-              <a:rPr lang="en-GB" sz="2400" dirty="0"/>
+              <a:rPr lang="en-GB" sz="2000" dirty="0"/>
               <a:t>Stopped using crossover. Only used mutation and permutation.</a:t>
             </a:r>
           </a:p>
@@ -5086,8 +5086,8 @@
               <a:buAutoNum type="arabicPeriod"/>
             </a:pPr>
             <a:r>
-              <a:rPr lang="en-GB" sz="2400" dirty="0"/>
-              <a:t>Increased population size from 4 to 10.</a:t>
+              <a:rPr lang="en-GB" sz="2000" dirty="0"/>
+              <a:t>Increased population size.</a:t>
             </a:r>
           </a:p>
           <a:p>
@@ -5095,7 +5095,7 @@
               <a:buAutoNum type="arabicPeriod"/>
             </a:pPr>
             <a:r>
-              <a:rPr lang="en-GB" sz="2400" dirty="0"/>
+              <a:rPr lang="en-GB" sz="2000" dirty="0"/>
               <a:t>Introduced more regular permutations, as these produced the best results.</a:t>
             </a:r>
           </a:p>
@@ -5104,8 +5104,8 @@
               <a:buAutoNum type="arabicPeriod"/>
             </a:pPr>
             <a:r>
-              <a:rPr lang="en-GB" sz="2400" dirty="0"/>
-              <a:t>Adjusted random mutation ranges.</a:t>
+              <a:rPr lang="en-GB" sz="2000" dirty="0"/>
+              <a:t>Adjusted random mutation ranges and changed it from uniform to Gaussian.</a:t>
             </a:r>
           </a:p>
           <a:p>
@@ -5113,7 +5113,7 @@
               <a:buAutoNum type="arabicPeriod"/>
             </a:pPr>
             <a:r>
-              <a:rPr lang="en-GB" sz="2400" dirty="0"/>
+              <a:rPr lang="en-GB" sz="2000" dirty="0"/>
               <a:t>Introduced an extra random structure at each iteration with less extreme alterations.</a:t>
             </a:r>
           </a:p>
@@ -5122,7 +5122,7 @@
               <a:buAutoNum type="arabicPeriod"/>
             </a:pPr>
             <a:r>
-              <a:rPr lang="en-GB" sz="2400" dirty="0"/>
+              <a:rPr lang="en-GB" sz="2000" dirty="0"/>
               <a:t>Specified stricter stopping criteria.</a:t>
             </a:r>
           </a:p>
@@ -5131,7 +5131,16 @@
               <a:buAutoNum type="arabicPeriod"/>
             </a:pPr>
             <a:r>
-              <a:rPr lang="en-GB" sz="2400" dirty="0"/>
+              <a:rPr lang="en-GB" sz="2000" dirty="0"/>
+              <a:t>Decreased space between atoms in initial model.</a:t>
+            </a:r>
+          </a:p>
+          <a:p>
+            <a:pPr marL="514350" indent="-514350">
+              <a:buAutoNum type="arabicPeriod"/>
+            </a:pPr>
+            <a:r>
+              <a:rPr lang="en-GB" sz="2000" dirty="0"/>
               <a:t>Acetone example:</a:t>
             </a:r>
           </a:p>
@@ -5226,6 +5235,141 @@
           </a:extLst>
         </p:spPr>
       </p:pic>
+      <p:pic>
+        <p:nvPicPr>
+          <p:cNvPr id="4" name="Picture 3">
+            <a:extLst>
+              <a:ext uri="{FF2B5EF4-FFF2-40B4-BE49-F238E27FC236}">
+                <a16:creationId xmlns:a16="http://schemas.microsoft.com/office/drawing/2014/main" id="{8E1F2705-99B8-42F0-B9A1-9F18C2807048}"/>
+              </a:ext>
+            </a:extLst>
+          </p:cNvPr>
+          <p:cNvPicPr>
+            <a:picLocks noChangeAspect="1"/>
+          </p:cNvPicPr>
+          <p:nvPr/>
+        </p:nvPicPr>
+        <p:blipFill>
+          <a:blip r:embed="rId4"/>
+          <a:stretch>
+            <a:fillRect/>
+          </a:stretch>
+        </p:blipFill>
+        <p:spPr>
+          <a:xfrm>
+            <a:off x="4439920" y="4215330"/>
+            <a:ext cx="4453572" cy="2568572"/>
+          </a:xfrm>
+          <a:prstGeom prst="rect">
+            <a:avLst/>
+          </a:prstGeom>
+        </p:spPr>
+      </p:pic>
+      <p:sp>
+        <p:nvSpPr>
+          <p:cNvPr id="7" name="TextBox 6">
+            <a:extLst>
+              <a:ext uri="{FF2B5EF4-FFF2-40B4-BE49-F238E27FC236}">
+                <a16:creationId xmlns:a16="http://schemas.microsoft.com/office/drawing/2014/main" id="{82600865-14F9-49E1-81E5-3F5887545224}"/>
+              </a:ext>
+            </a:extLst>
+          </p:cNvPr>
+          <p:cNvSpPr txBox="1"/>
+          <p:nvPr/>
+        </p:nvSpPr>
+        <p:spPr>
+          <a:xfrm>
+            <a:off x="6424978" y="3665805"/>
+            <a:ext cx="3230880" cy="646331"/>
+          </a:xfrm>
+          <a:prstGeom prst="rect">
+            <a:avLst/>
+          </a:prstGeom>
+          <a:noFill/>
+        </p:spPr>
+        <p:txBody>
+          <a:bodyPr wrap="square" rtlCol="0">
+            <a:spAutoFit/>
+          </a:bodyPr>
+          <a:lstStyle/>
+          <a:p>
+            <a:r>
+              <a:rPr lang="en-GB" dirty="0"/>
+              <a:t>After: The shape is still bad but the energy is better.</a:t>
+            </a:r>
+          </a:p>
+        </p:txBody>
+      </p:sp>
+      <p:sp>
+        <p:nvSpPr>
+          <p:cNvPr id="8" name="TextBox 7">
+            <a:extLst>
+              <a:ext uri="{FF2B5EF4-FFF2-40B4-BE49-F238E27FC236}">
+                <a16:creationId xmlns:a16="http://schemas.microsoft.com/office/drawing/2014/main" id="{9AD63D94-582B-479E-8410-358C59DF8A2D}"/>
+              </a:ext>
+            </a:extLst>
+          </p:cNvPr>
+          <p:cNvSpPr txBox="1"/>
+          <p:nvPr/>
+        </p:nvSpPr>
+        <p:spPr>
+          <a:xfrm>
+            <a:off x="994652" y="4365331"/>
+            <a:ext cx="3362960" cy="366830"/>
+          </a:xfrm>
+          <a:prstGeom prst="rect">
+            <a:avLst/>
+          </a:prstGeom>
+          <a:noFill/>
+        </p:spPr>
+        <p:txBody>
+          <a:bodyPr wrap="square" rtlCol="0">
+            <a:spAutoFit/>
+          </a:bodyPr>
+          <a:lstStyle/>
+          <a:p>
+            <a:r>
+              <a:rPr lang="en-GB" dirty="0"/>
+              <a:t>Before:</a:t>
+            </a:r>
+          </a:p>
+        </p:txBody>
+      </p:sp>
+      <p:sp>
+        <p:nvSpPr>
+          <p:cNvPr id="9" name="TextBox 8">
+            <a:extLst>
+              <a:ext uri="{FF2B5EF4-FFF2-40B4-BE49-F238E27FC236}">
+                <a16:creationId xmlns:a16="http://schemas.microsoft.com/office/drawing/2014/main" id="{EAE4B175-87C1-47BC-80FB-4F3F58A539D4}"/>
+              </a:ext>
+            </a:extLst>
+          </p:cNvPr>
+          <p:cNvSpPr txBox="1"/>
+          <p:nvPr/>
+        </p:nvSpPr>
+        <p:spPr>
+          <a:xfrm>
+            <a:off x="10153236" y="4070866"/>
+            <a:ext cx="2265680" cy="369332"/>
+          </a:xfrm>
+          <a:prstGeom prst="rect">
+            <a:avLst/>
+          </a:prstGeom>
+          <a:noFill/>
+        </p:spPr>
+        <p:txBody>
+          <a:bodyPr wrap="square" rtlCol="0">
+            <a:spAutoFit/>
+          </a:bodyPr>
+          <a:lstStyle/>
+          <a:p>
+            <a:r>
+              <a:rPr lang="en-GB" dirty="0"/>
+              <a:t>Actual shape</a:t>
+            </a:r>
+          </a:p>
+        </p:txBody>
+      </p:sp>
     </p:spTree>
     <p:extLst>
       <p:ext uri="{BB962C8B-B14F-4D97-AF65-F5344CB8AC3E}">

</xml_diff>

<commit_message>
Finished ppt to explain Sprint 2.
</commit_message>
<xml_diff>
--- a/Documentation/Sprint2/Presentation.pptx
+++ b/Documentation/Sprint2/Presentation.pptx
@@ -23,7 +23,6 @@
     <p:sldId id="273" r:id="rId17"/>
     <p:sldId id="274" r:id="rId18"/>
     <p:sldId id="275" r:id="rId19"/>
-    <p:sldId id="272" r:id="rId20"/>
   </p:sldIdLst>
   <p:sldSz cx="12192000" cy="6858000"/>
   <p:notesSz cx="6858000" cy="9144000"/>
@@ -279,7 +278,7 @@
           <a:p>
             <a:fld id="{356398C4-E08F-4EC0-878B-73220DB3C114}" type="datetimeFigureOut">
               <a:rPr lang="en-GB" smtClean="0"/>
-              <a:t>22/11/2020</a:t>
+              <a:t>23/11/2020</a:t>
             </a:fld>
             <a:endParaRPr lang="en-GB"/>
           </a:p>
@@ -479,7 +478,7 @@
           <a:p>
             <a:fld id="{356398C4-E08F-4EC0-878B-73220DB3C114}" type="datetimeFigureOut">
               <a:rPr lang="en-GB" smtClean="0"/>
-              <a:t>22/11/2020</a:t>
+              <a:t>23/11/2020</a:t>
             </a:fld>
             <a:endParaRPr lang="en-GB"/>
           </a:p>
@@ -689,7 +688,7 @@
           <a:p>
             <a:fld id="{356398C4-E08F-4EC0-878B-73220DB3C114}" type="datetimeFigureOut">
               <a:rPr lang="en-GB" smtClean="0"/>
-              <a:t>22/11/2020</a:t>
+              <a:t>23/11/2020</a:t>
             </a:fld>
             <a:endParaRPr lang="en-GB"/>
           </a:p>
@@ -889,7 +888,7 @@
           <a:p>
             <a:fld id="{356398C4-E08F-4EC0-878B-73220DB3C114}" type="datetimeFigureOut">
               <a:rPr lang="en-GB" smtClean="0"/>
-              <a:t>22/11/2020</a:t>
+              <a:t>23/11/2020</a:t>
             </a:fld>
             <a:endParaRPr lang="en-GB"/>
           </a:p>
@@ -1165,7 +1164,7 @@
           <a:p>
             <a:fld id="{356398C4-E08F-4EC0-878B-73220DB3C114}" type="datetimeFigureOut">
               <a:rPr lang="en-GB" smtClean="0"/>
-              <a:t>22/11/2020</a:t>
+              <a:t>23/11/2020</a:t>
             </a:fld>
             <a:endParaRPr lang="en-GB"/>
           </a:p>
@@ -1433,7 +1432,7 @@
           <a:p>
             <a:fld id="{356398C4-E08F-4EC0-878B-73220DB3C114}" type="datetimeFigureOut">
               <a:rPr lang="en-GB" smtClean="0"/>
-              <a:t>22/11/2020</a:t>
+              <a:t>23/11/2020</a:t>
             </a:fld>
             <a:endParaRPr lang="en-GB"/>
           </a:p>
@@ -1848,7 +1847,7 @@
           <a:p>
             <a:fld id="{356398C4-E08F-4EC0-878B-73220DB3C114}" type="datetimeFigureOut">
               <a:rPr lang="en-GB" smtClean="0"/>
-              <a:t>22/11/2020</a:t>
+              <a:t>23/11/2020</a:t>
             </a:fld>
             <a:endParaRPr lang="en-GB"/>
           </a:p>
@@ -1990,7 +1989,7 @@
           <a:p>
             <a:fld id="{356398C4-E08F-4EC0-878B-73220DB3C114}" type="datetimeFigureOut">
               <a:rPr lang="en-GB" smtClean="0"/>
-              <a:t>22/11/2020</a:t>
+              <a:t>23/11/2020</a:t>
             </a:fld>
             <a:endParaRPr lang="en-GB"/>
           </a:p>
@@ -2103,7 +2102,7 @@
           <a:p>
             <a:fld id="{356398C4-E08F-4EC0-878B-73220DB3C114}" type="datetimeFigureOut">
               <a:rPr lang="en-GB" smtClean="0"/>
-              <a:t>22/11/2020</a:t>
+              <a:t>23/11/2020</a:t>
             </a:fld>
             <a:endParaRPr lang="en-GB"/>
           </a:p>
@@ -2416,7 +2415,7 @@
           <a:p>
             <a:fld id="{356398C4-E08F-4EC0-878B-73220DB3C114}" type="datetimeFigureOut">
               <a:rPr lang="en-GB" smtClean="0"/>
-              <a:t>22/11/2020</a:t>
+              <a:t>23/11/2020</a:t>
             </a:fld>
             <a:endParaRPr lang="en-GB"/>
           </a:p>
@@ -2705,7 +2704,7 @@
           <a:p>
             <a:fld id="{356398C4-E08F-4EC0-878B-73220DB3C114}" type="datetimeFigureOut">
               <a:rPr lang="en-GB" smtClean="0"/>
-              <a:t>22/11/2020</a:t>
+              <a:t>23/11/2020</a:t>
             </a:fld>
             <a:endParaRPr lang="en-GB"/>
           </a:p>
@@ -2948,7 +2947,7 @@
           <a:p>
             <a:fld id="{356398C4-E08F-4EC0-878B-73220DB3C114}" type="datetimeFigureOut">
               <a:rPr lang="en-GB" smtClean="0"/>
-              <a:t>22/11/2020</a:t>
+              <a:t>23/11/2020</a:t>
             </a:fld>
             <a:endParaRPr lang="en-GB"/>
           </a:p>
@@ -4465,7 +4464,7 @@
           <a:p>
             <a:r>
               <a:rPr lang="en-GB" dirty="0"/>
-              <a:t>If the best energy value doesn’t change very much for 3 consecutive iterations, it is probably finished.</a:t>
+              <a:t>If the best energy value doesn’t change very much for several consecutive iterations, it is probably finished.</a:t>
             </a:r>
           </a:p>
         </p:txBody>
@@ -4567,7 +4566,7 @@
             </a:pPr>
             <a:r>
               <a:rPr lang="en-GB" dirty="0"/>
-              <a:t>If the best energy value doesn’t change very much for 3 consecutive iterations, it is probably finished.</a:t>
+              <a:t>If the best energy value doesn’t change very much for a few consecutive iterations, it is probably finished.</a:t>
             </a:r>
           </a:p>
         </p:txBody>
@@ -4693,9 +4692,12 @@
           </a:bodyPr>
           <a:lstStyle/>
           <a:p>
+            <a:pPr marL="0" indent="0">
+              <a:buNone/>
+            </a:pPr>
             <a:r>
               <a:rPr lang="en-GB" sz="2000" dirty="0"/>
-              <a:t>It didn’t work. It immediately found a (terrible) local minimum and stayed there, because:</a:t>
+              <a:t>It performed badly. It immediately found a poor local minimum and stayed there, because:</a:t>
             </a:r>
           </a:p>
           <a:p>
@@ -4729,6 +4731,9 @@
             </a:r>
           </a:p>
           <a:p>
+            <a:pPr marL="0" indent="0">
+              <a:buNone/>
+            </a:pPr>
             <a:r>
               <a:rPr lang="en-GB" sz="2000" dirty="0"/>
               <a:t>Acetone example:</a:t>
@@ -4984,6 +4989,41 @@
           </a:fontRef>
         </p:style>
       </p:cxnSp>
+      <p:sp>
+        <p:nvSpPr>
+          <p:cNvPr id="5" name="TextBox 4">
+            <a:extLst>
+              <a:ext uri="{FF2B5EF4-FFF2-40B4-BE49-F238E27FC236}">
+                <a16:creationId xmlns:a16="http://schemas.microsoft.com/office/drawing/2014/main" id="{3E4314C7-560C-4E9E-BAB3-0DC4D6F9A93A}"/>
+              </a:ext>
+            </a:extLst>
+          </p:cNvPr>
+          <p:cNvSpPr txBox="1"/>
+          <p:nvPr/>
+        </p:nvSpPr>
+        <p:spPr>
+          <a:xfrm>
+            <a:off x="9324975" y="4836557"/>
+            <a:ext cx="3056889" cy="369332"/>
+          </a:xfrm>
+          <a:prstGeom prst="rect">
+            <a:avLst/>
+          </a:prstGeom>
+          <a:noFill/>
+        </p:spPr>
+        <p:txBody>
+          <a:bodyPr wrap="square" rtlCol="0">
+            <a:spAutoFit/>
+          </a:bodyPr>
+          <a:lstStyle/>
+          <a:p>
+            <a:r>
+              <a:rPr lang="en-GB" dirty="0"/>
+              <a:t>https://www.turbosquid.com</a:t>
+            </a:r>
+          </a:p>
+        </p:txBody>
+      </p:sp>
     </p:spTree>
     <p:extLst>
       <p:ext uri="{BB962C8B-B14F-4D97-AF65-F5344CB8AC3E}">
@@ -5065,7 +5105,7 @@
         </p:nvSpPr>
         <p:spPr>
           <a:xfrm>
-            <a:off x="838200" y="969168"/>
+            <a:off x="371475" y="902493"/>
             <a:ext cx="10515600" cy="5053013"/>
           </a:xfrm>
         </p:spPr>
@@ -5123,7 +5163,7 @@
             </a:pPr>
             <a:r>
               <a:rPr lang="en-GB" sz="2000" dirty="0"/>
-              <a:t>Specified stricter stopping criteria.</a:t>
+              <a:t>Introduced a correction which pushed hydrogen atoms towards carbon atoms.</a:t>
             </a:r>
           </a:p>
           <a:p>
@@ -5132,7 +5172,7 @@
             </a:pPr>
             <a:r>
               <a:rPr lang="en-GB" sz="2000" dirty="0"/>
-              <a:t>Decreased space between atoms in initial model.</a:t>
+              <a:t>Specified stricter stopping criteria and stopped extreme energies being added.</a:t>
             </a:r>
           </a:p>
           <a:p>
@@ -5141,7 +5181,7 @@
             </a:pPr>
             <a:r>
               <a:rPr lang="en-GB" sz="2000" dirty="0"/>
-              <a:t>Acetone example:</a:t>
+              <a:t>Decreased space between atoms in initial model.</a:t>
             </a:r>
           </a:p>
           <a:p>
@@ -5294,8 +5334,20 @@
           <a:lstStyle/>
           <a:p>
             <a:r>
-              <a:rPr lang="en-GB" dirty="0"/>
-              <a:t>After: The shape is still bad but the energy is better.</a:t>
+              <a:rPr lang="en-GB" b="1" dirty="0">
+                <a:solidFill>
+                  <a:srgbClr val="FF0000"/>
+                </a:solidFill>
+              </a:rPr>
+              <a:t>After: </a:t>
+            </a:r>
+            <a:r>
+              <a:rPr lang="en-GB" dirty="0">
+                <a:solidFill>
+                  <a:srgbClr val="FF0000"/>
+                </a:solidFill>
+              </a:rPr>
+              <a:t>The shape is still bad but the energy is better.</a:t>
             </a:r>
           </a:p>
         </p:txBody>
@@ -5314,7 +5366,7 @@
         </p:nvSpPr>
         <p:spPr>
           <a:xfrm>
-            <a:off x="994652" y="4365331"/>
+            <a:off x="1530177" y="4276666"/>
             <a:ext cx="3362960" cy="366830"/>
           </a:xfrm>
           <a:prstGeom prst="rect">
@@ -5329,7 +5381,11 @@
           <a:lstStyle/>
           <a:p>
             <a:r>
-              <a:rPr lang="en-GB" dirty="0"/>
+              <a:rPr lang="en-GB" b="1" dirty="0">
+                <a:solidFill>
+                  <a:srgbClr val="FF0000"/>
+                </a:solidFill>
+              </a:rPr>
               <a:t>Before:</a:t>
             </a:r>
           </a:p>
@@ -5370,109 +5426,84 @@
           </a:p>
         </p:txBody>
       </p:sp>
+      <p:sp>
+        <p:nvSpPr>
+          <p:cNvPr id="10" name="TextBox 9">
+            <a:extLst>
+              <a:ext uri="{FF2B5EF4-FFF2-40B4-BE49-F238E27FC236}">
+                <a16:creationId xmlns:a16="http://schemas.microsoft.com/office/drawing/2014/main" id="{3FD5BF4F-0275-4528-9CE1-0B6B3B5DFED9}"/>
+              </a:ext>
+            </a:extLst>
+          </p:cNvPr>
+          <p:cNvSpPr txBox="1"/>
+          <p:nvPr/>
+        </p:nvSpPr>
+        <p:spPr>
+          <a:xfrm>
+            <a:off x="9067800" y="6391275"/>
+            <a:ext cx="3124200" cy="369332"/>
+          </a:xfrm>
+          <a:prstGeom prst="rect">
+            <a:avLst/>
+          </a:prstGeom>
+          <a:noFill/>
+        </p:spPr>
+        <p:txBody>
+          <a:bodyPr wrap="square" rtlCol="0">
+            <a:spAutoFit/>
+          </a:bodyPr>
+          <a:lstStyle/>
+          <a:p>
+            <a:r>
+              <a:rPr lang="en-GB" dirty="0"/>
+              <a:t>https://www.turbosquid.com</a:t>
+            </a:r>
+          </a:p>
+        </p:txBody>
+      </p:sp>
+      <p:cxnSp>
+        <p:nvCxnSpPr>
+          <p:cNvPr id="14" name="Straight Arrow Connector 13">
+            <a:extLst>
+              <a:ext uri="{FF2B5EF4-FFF2-40B4-BE49-F238E27FC236}">
+                <a16:creationId xmlns:a16="http://schemas.microsoft.com/office/drawing/2014/main" id="{D5031AEF-B1D8-497E-B307-CCDCB8C677D1}"/>
+              </a:ext>
+            </a:extLst>
+          </p:cNvPr>
+          <p:cNvCxnSpPr/>
+          <p:nvPr/>
+        </p:nvCxnSpPr>
+        <p:spPr>
+          <a:xfrm flipH="1">
+            <a:off x="7877175" y="4215330"/>
+            <a:ext cx="285750" cy="2042595"/>
+          </a:xfrm>
+          <a:prstGeom prst="straightConnector1">
+            <a:avLst/>
+          </a:prstGeom>
+          <a:ln>
+            <a:tailEnd type="triangle"/>
+          </a:ln>
+        </p:spPr>
+        <p:style>
+          <a:lnRef idx="1">
+            <a:schemeClr val="accent4"/>
+          </a:lnRef>
+          <a:fillRef idx="0">
+            <a:schemeClr val="accent4"/>
+          </a:fillRef>
+          <a:effectRef idx="0">
+            <a:schemeClr val="accent4"/>
+          </a:effectRef>
+          <a:fontRef idx="minor">
+            <a:schemeClr val="tx1"/>
+          </a:fontRef>
+        </p:style>
+      </p:cxnSp>
     </p:spTree>
     <p:extLst>
       <p:ext uri="{BB962C8B-B14F-4D97-AF65-F5344CB8AC3E}">
         <p14:creationId xmlns:p14="http://schemas.microsoft.com/office/powerpoint/2010/main" val="376971407"/>
-      </p:ext>
-    </p:extLst>
-  </p:cSld>
-  <p:clrMapOvr>
-    <a:masterClrMapping/>
-  </p:clrMapOvr>
-</p:sld>
-</file>
-
-<file path=ppt/slides/slide19.xml><?xml version="1.0" encoding="utf-8"?>
-<p:sld xmlns:a="http://schemas.openxmlformats.org/drawingml/2006/main" xmlns:r="http://schemas.openxmlformats.org/officeDocument/2006/relationships" xmlns:p="http://schemas.openxmlformats.org/presentationml/2006/main">
-  <p:cSld>
-    <p:spTree>
-      <p:nvGrpSpPr>
-        <p:cNvPr id="1" name=""/>
-        <p:cNvGrpSpPr/>
-        <p:nvPr/>
-      </p:nvGrpSpPr>
-      <p:grpSpPr>
-        <a:xfrm>
-          <a:off x="0" y="0"/>
-          <a:ext cx="0" cy="0"/>
-          <a:chOff x="0" y="0"/>
-          <a:chExt cx="0" cy="0"/>
-        </a:xfrm>
-      </p:grpSpPr>
-      <p:sp>
-        <p:nvSpPr>
-          <p:cNvPr id="2" name="Title 1">
-            <a:extLst>
-              <a:ext uri="{FF2B5EF4-FFF2-40B4-BE49-F238E27FC236}">
-                <a16:creationId xmlns:a16="http://schemas.microsoft.com/office/drawing/2014/main" id="{13BDA6BC-EAE3-4F9A-8715-89E53FDEAD82}"/>
-              </a:ext>
-            </a:extLst>
-          </p:cNvPr>
-          <p:cNvSpPr>
-            <a:spLocks noGrp="1"/>
-          </p:cNvSpPr>
-          <p:nvPr>
-            <p:ph type="title"/>
-          </p:nvPr>
-        </p:nvSpPr>
-        <p:spPr/>
-        <p:txBody>
-          <a:bodyPr/>
-          <a:lstStyle/>
-          <a:p>
-            <a:r>
-              <a:rPr lang="en-GB" dirty="0"/>
-              <a:t>Issues - other</a:t>
-            </a:r>
-          </a:p>
-        </p:txBody>
-      </p:sp>
-      <p:sp>
-        <p:nvSpPr>
-          <p:cNvPr id="3" name="Content Placeholder 2">
-            <a:extLst>
-              <a:ext uri="{FF2B5EF4-FFF2-40B4-BE49-F238E27FC236}">
-                <a16:creationId xmlns:a16="http://schemas.microsoft.com/office/drawing/2014/main" id="{CD553DD6-9DC4-422F-92F6-39A254163C52}"/>
-              </a:ext>
-            </a:extLst>
-          </p:cNvPr>
-          <p:cNvSpPr>
-            <a:spLocks noGrp="1"/>
-          </p:cNvSpPr>
-          <p:nvPr>
-            <p:ph idx="1"/>
-          </p:nvPr>
-        </p:nvSpPr>
-        <p:spPr>
-          <a:xfrm>
-            <a:off x="752475" y="1425575"/>
-            <a:ext cx="10515600" cy="5067300"/>
-          </a:xfrm>
-        </p:spPr>
-        <p:txBody>
-          <a:bodyPr>
-            <a:normAutofit/>
-          </a:bodyPr>
-          <a:lstStyle/>
-          <a:p>
-            <a:pPr marL="0" indent="0">
-              <a:buNone/>
-            </a:pPr>
-            <a:endParaRPr lang="en-GB" dirty="0"/>
-          </a:p>
-          <a:p>
-            <a:r>
-              <a:rPr lang="en-GB" dirty="0"/>
-              <a:t>Workload / time management – I can’t keep up with the sprints. Having to work too long (all weekend + evenings + all the time) which is unhealthy.</a:t>
-            </a:r>
-          </a:p>
-        </p:txBody>
-      </p:sp>
-    </p:spTree>
-    <p:extLst>
-      <p:ext uri="{BB962C8B-B14F-4D97-AF65-F5344CB8AC3E}">
-        <p14:creationId xmlns:p14="http://schemas.microsoft.com/office/powerpoint/2010/main" val="3366465887"/>
       </p:ext>
     </p:extLst>
   </p:cSld>

</xml_diff>